<commit_message>
promo-media: Add media for CWS
</commit_message>
<xml_diff>
--- a/dist-env/src/promo.pptx
+++ b/dist-env/src/promo.pptx
@@ -5,15 +5,16 @@
     <p:sldMasterId id="2147483648" r:id="rId1"/>
   </p:sldMasterIdLst>
   <p:notesMasterIdLst>
-    <p:notesMasterId r:id="rId8"/>
+    <p:notesMasterId r:id="rId9"/>
   </p:notesMasterIdLst>
   <p:sldIdLst>
-    <p:sldId id="256" r:id="rId2"/>
-    <p:sldId id="261" r:id="rId3"/>
-    <p:sldId id="262" r:id="rId4"/>
-    <p:sldId id="259" r:id="rId5"/>
-    <p:sldId id="258" r:id="rId6"/>
-    <p:sldId id="260" r:id="rId7"/>
+    <p:sldId id="263" r:id="rId2"/>
+    <p:sldId id="256" r:id="rId3"/>
+    <p:sldId id="261" r:id="rId4"/>
+    <p:sldId id="262" r:id="rId5"/>
+    <p:sldId id="259" r:id="rId6"/>
+    <p:sldId id="258" r:id="rId7"/>
+    <p:sldId id="260" r:id="rId8"/>
   </p:sldIdLst>
   <p:sldSz cx="12192000" cy="6858000"/>
   <p:notesSz cx="6858000" cy="9144000"/>
@@ -202,7 +203,7 @@
           <a:p>
             <a:fld id="{DA1CD8E3-66EA-4860-B6DD-845275B8FDA1}" type="datetimeFigureOut">
               <a:rPr lang="en-GB" smtClean="0"/>
-              <a:t>31/05/2018</a:t>
+              <a:t>04/06/18</a:t>
             </a:fld>
             <a:endParaRPr lang="en-GB"/>
           </a:p>
@@ -539,7 +540,7 @@
           <a:p>
             <a:fld id="{427AF63E-676C-490F-B031-3BAEFE8BE401}" type="slidenum">
               <a:rPr lang="en-GB" smtClean="0"/>
-              <a:t>1</a:t>
+              <a:t>2</a:t>
             </a:fld>
             <a:endParaRPr lang="en-GB"/>
           </a:p>
@@ -627,7 +628,7 @@
           <a:p>
             <a:fld id="{427AF63E-676C-490F-B031-3BAEFE8BE401}" type="slidenum">
               <a:rPr lang="en-GB" smtClean="0"/>
-              <a:t>2</a:t>
+              <a:t>3</a:t>
             </a:fld>
             <a:endParaRPr lang="en-GB"/>
           </a:p>
@@ -715,7 +716,7 @@
           <a:p>
             <a:fld id="{427AF63E-676C-490F-B031-3BAEFE8BE401}" type="slidenum">
               <a:rPr lang="en-GB" smtClean="0"/>
-              <a:t>3</a:t>
+              <a:t>4</a:t>
             </a:fld>
             <a:endParaRPr lang="en-GB"/>
           </a:p>
@@ -803,7 +804,7 @@
           <a:p>
             <a:fld id="{427AF63E-676C-490F-B031-3BAEFE8BE401}" type="slidenum">
               <a:rPr lang="en-GB" smtClean="0"/>
-              <a:t>4</a:t>
+              <a:t>5</a:t>
             </a:fld>
             <a:endParaRPr lang="en-GB"/>
           </a:p>
@@ -891,7 +892,7 @@
           <a:p>
             <a:fld id="{427AF63E-676C-490F-B031-3BAEFE8BE401}" type="slidenum">
               <a:rPr lang="en-GB" smtClean="0"/>
-              <a:t>5</a:t>
+              <a:t>6</a:t>
             </a:fld>
             <a:endParaRPr lang="en-GB"/>
           </a:p>
@@ -1041,7 +1042,7 @@
           <a:p>
             <a:fld id="{2ACA34EB-1D88-4E75-BE2F-6D09A74D6EB9}" type="datetimeFigureOut">
               <a:rPr lang="en-GB" smtClean="0"/>
-              <a:t>31/05/2018</a:t>
+              <a:t>04/06/18</a:t>
             </a:fld>
             <a:endParaRPr lang="en-GB"/>
           </a:p>
@@ -1211,7 +1212,7 @@
           <a:p>
             <a:fld id="{2ACA34EB-1D88-4E75-BE2F-6D09A74D6EB9}" type="datetimeFigureOut">
               <a:rPr lang="en-GB" smtClean="0"/>
-              <a:t>31/05/2018</a:t>
+              <a:t>04/06/18</a:t>
             </a:fld>
             <a:endParaRPr lang="en-GB"/>
           </a:p>
@@ -1391,7 +1392,7 @@
           <a:p>
             <a:fld id="{2ACA34EB-1D88-4E75-BE2F-6D09A74D6EB9}" type="datetimeFigureOut">
               <a:rPr lang="en-GB" smtClean="0"/>
-              <a:t>31/05/2018</a:t>
+              <a:t>04/06/18</a:t>
             </a:fld>
             <a:endParaRPr lang="en-GB"/>
           </a:p>
@@ -1561,7 +1562,7 @@
           <a:p>
             <a:fld id="{2ACA34EB-1D88-4E75-BE2F-6D09A74D6EB9}" type="datetimeFigureOut">
               <a:rPr lang="en-GB" smtClean="0"/>
-              <a:t>31/05/2018</a:t>
+              <a:t>04/06/18</a:t>
             </a:fld>
             <a:endParaRPr lang="en-GB"/>
           </a:p>
@@ -1807,7 +1808,7 @@
           <a:p>
             <a:fld id="{2ACA34EB-1D88-4E75-BE2F-6D09A74D6EB9}" type="datetimeFigureOut">
               <a:rPr lang="en-GB" smtClean="0"/>
-              <a:t>31/05/2018</a:t>
+              <a:t>04/06/18</a:t>
             </a:fld>
             <a:endParaRPr lang="en-GB"/>
           </a:p>
@@ -2039,7 +2040,7 @@
           <a:p>
             <a:fld id="{2ACA34EB-1D88-4E75-BE2F-6D09A74D6EB9}" type="datetimeFigureOut">
               <a:rPr lang="en-GB" smtClean="0"/>
-              <a:t>31/05/2018</a:t>
+              <a:t>04/06/18</a:t>
             </a:fld>
             <a:endParaRPr lang="en-GB"/>
           </a:p>
@@ -2406,7 +2407,7 @@
           <a:p>
             <a:fld id="{2ACA34EB-1D88-4E75-BE2F-6D09A74D6EB9}" type="datetimeFigureOut">
               <a:rPr lang="en-GB" smtClean="0"/>
-              <a:t>31/05/2018</a:t>
+              <a:t>04/06/18</a:t>
             </a:fld>
             <a:endParaRPr lang="en-GB"/>
           </a:p>
@@ -2524,7 +2525,7 @@
           <a:p>
             <a:fld id="{2ACA34EB-1D88-4E75-BE2F-6D09A74D6EB9}" type="datetimeFigureOut">
               <a:rPr lang="en-GB" smtClean="0"/>
-              <a:t>31/05/2018</a:t>
+              <a:t>04/06/18</a:t>
             </a:fld>
             <a:endParaRPr lang="en-GB"/>
           </a:p>
@@ -2619,7 +2620,7 @@
           <a:p>
             <a:fld id="{2ACA34EB-1D88-4E75-BE2F-6D09A74D6EB9}" type="datetimeFigureOut">
               <a:rPr lang="en-GB" smtClean="0"/>
-              <a:t>31/05/2018</a:t>
+              <a:t>04/06/18</a:t>
             </a:fld>
             <a:endParaRPr lang="en-GB"/>
           </a:p>
@@ -2896,7 +2897,7 @@
           <a:p>
             <a:fld id="{2ACA34EB-1D88-4E75-BE2F-6D09A74D6EB9}" type="datetimeFigureOut">
               <a:rPr lang="en-GB" smtClean="0"/>
-              <a:t>31/05/2018</a:t>
+              <a:t>04/06/18</a:t>
             </a:fld>
             <a:endParaRPr lang="en-GB"/>
           </a:p>
@@ -3149,7 +3150,7 @@
           <a:p>
             <a:fld id="{2ACA34EB-1D88-4E75-BE2F-6D09A74D6EB9}" type="datetimeFigureOut">
               <a:rPr lang="en-GB" smtClean="0"/>
-              <a:t>31/05/2018</a:t>
+              <a:t>04/06/18</a:t>
             </a:fld>
             <a:endParaRPr lang="en-GB"/>
           </a:p>
@@ -3367,7 +3368,7 @@
           <a:p>
             <a:fld id="{2ACA34EB-1D88-4E75-BE2F-6D09A74D6EB9}" type="datetimeFigureOut">
               <a:rPr lang="en-GB" smtClean="0"/>
-              <a:t>31/05/2018</a:t>
+              <a:t>04/06/18</a:t>
             </a:fld>
             <a:endParaRPr lang="en-GB"/>
           </a:p>
@@ -3772,6 +3773,97 @@
           <a:chExt cx="0" cy="0"/>
         </a:xfrm>
       </p:grpSpPr>
+      <p:sp>
+        <p:nvSpPr>
+          <p:cNvPr id="3" name="Content Placeholder 2"/>
+          <p:cNvSpPr>
+            <a:spLocks noGrp="1"/>
+          </p:cNvSpPr>
+          <p:nvPr>
+            <p:ph idx="1"/>
+          </p:nvPr>
+        </p:nvSpPr>
+        <p:spPr/>
+        <p:txBody>
+          <a:bodyPr/>
+          <a:lstStyle/>
+          <a:p>
+            <a:pPr marL="0" indent="0">
+              <a:buNone/>
+            </a:pPr>
+            <a:r>
+              <a:rPr lang="en-US" dirty="0" smtClean="0"/>
+              <a:t>Slide # - good for dims</a:t>
+            </a:r>
+          </a:p>
+          <a:p>
+            <a:pPr marL="0" indent="0">
+              <a:buNone/>
+            </a:pPr>
+            <a:r>
+              <a:rPr lang="en-US" dirty="0" smtClean="0"/>
+              <a:t>1 – tile 440x280, </a:t>
+            </a:r>
+            <a:r>
+              <a:rPr lang="en-US" dirty="0" err="1" smtClean="0"/>
+              <a:t>tmp</a:t>
+            </a:r>
+            <a:r>
+              <a:rPr lang="en-US" dirty="0" smtClean="0"/>
+              <a:t> screenshot 1280x800</a:t>
+            </a:r>
+          </a:p>
+          <a:p>
+            <a:pPr marL="0" indent="0">
+              <a:buNone/>
+            </a:pPr>
+            <a:r>
+              <a:rPr lang="en-US" dirty="0" smtClean="0"/>
+              <a:t>2- tile 920x680</a:t>
+            </a:r>
+          </a:p>
+          <a:p>
+            <a:pPr marL="0" indent="0">
+              <a:buNone/>
+            </a:pPr>
+            <a:r>
+              <a:rPr lang="en-US" dirty="0" smtClean="0"/>
+              <a:t>3 – marquee 1400x560</a:t>
+            </a:r>
+            <a:endParaRPr lang="en-US" dirty="0"/>
+          </a:p>
+        </p:txBody>
+      </p:sp>
+    </p:spTree>
+    <p:extLst>
+      <p:ext uri="{BB962C8B-B14F-4D97-AF65-F5344CB8AC3E}">
+        <p14:creationId xmlns:p14="http://schemas.microsoft.com/office/powerpoint/2010/main" val="4091992019"/>
+      </p:ext>
+    </p:extLst>
+  </p:cSld>
+  <p:clrMapOvr>
+    <a:masterClrMapping/>
+  </p:clrMapOvr>
+</p:sld>
+</file>
+
+<file path=ppt/slides/slide2.xml><?xml version="1.0" encoding="utf-8"?>
+<p:sld xmlns:a="http://schemas.openxmlformats.org/drawingml/2006/main" xmlns:r="http://schemas.openxmlformats.org/officeDocument/2006/relationships" xmlns:p="http://schemas.openxmlformats.org/presentationml/2006/main">
+  <p:cSld>
+    <p:spTree>
+      <p:nvGrpSpPr>
+        <p:cNvPr id="1" name=""/>
+        <p:cNvGrpSpPr/>
+        <p:nvPr/>
+      </p:nvGrpSpPr>
+      <p:grpSpPr>
+        <a:xfrm>
+          <a:off x="0" y="0"/>
+          <a:ext cx="0" cy="0"/>
+          <a:chOff x="0" y="0"/>
+          <a:chExt cx="0" cy="0"/>
+        </a:xfrm>
+      </p:grpSpPr>
       <p:pic>
         <p:nvPicPr>
           <p:cNvPr id="5" name="Picture 4"/>
@@ -3800,6 +3892,7 @@
           <a:prstGeom prst="rect">
             <a:avLst/>
           </a:prstGeom>
+          <a:noFill/>
         </p:spPr>
       </p:pic>
       <p:sp>
@@ -3902,14 +3995,6 @@
               </a:rPr>
               <a:t>Google Slides decks</a:t>
             </a:r>
-            <a:endParaRPr lang="en-US" sz="5400" dirty="0" smtClean="0">
-              <a:solidFill>
-                <a:schemeClr val="tx1">
-                  <a:lumMod val="75000"/>
-                  <a:lumOff val="25000"/>
-                </a:schemeClr>
-              </a:solidFill>
-            </a:endParaRPr>
           </a:p>
         </p:txBody>
       </p:sp>
@@ -3963,7 +4048,7 @@
 </p:sld>
 </file>
 
-<file path=ppt/slides/slide2.xml><?xml version="1.0" encoding="utf-8"?>
+<file path=ppt/slides/slide3.xml><?xml version="1.0" encoding="utf-8"?>
 <p:sld xmlns:a="http://schemas.openxmlformats.org/drawingml/2006/main" xmlns:r="http://schemas.openxmlformats.org/officeDocument/2006/relationships" xmlns:p="http://schemas.openxmlformats.org/presentationml/2006/main">
   <p:cSld>
     <p:spTree>
@@ -4140,14 +4225,6 @@
               </a:rPr>
               <a:t>Google Slides decks</a:t>
             </a:r>
-            <a:endParaRPr lang="en-US" sz="5400" dirty="0" smtClean="0">
-              <a:solidFill>
-                <a:schemeClr val="tx1">
-                  <a:lumMod val="75000"/>
-                  <a:lumOff val="25000"/>
-                </a:schemeClr>
-              </a:solidFill>
-            </a:endParaRPr>
           </a:p>
         </p:txBody>
       </p:sp>
@@ -4171,7 +4248,7 @@
 </p:sld>
 </file>
 
-<file path=ppt/slides/slide3.xml><?xml version="1.0" encoding="utf-8"?>
+<file path=ppt/slides/slide4.xml><?xml version="1.0" encoding="utf-8"?>
 <p:sld xmlns:a="http://schemas.openxmlformats.org/drawingml/2006/main" xmlns:r="http://schemas.openxmlformats.org/officeDocument/2006/relationships" xmlns:p="http://schemas.openxmlformats.org/presentationml/2006/main">
   <p:cSld>
     <p:spTree>
@@ -4305,14 +4382,6 @@
               </a:rPr>
               <a:t>Breeze through merging Google Slides decks</a:t>
             </a:r>
-            <a:endParaRPr lang="en-US" sz="3200" dirty="0" smtClean="0">
-              <a:solidFill>
-                <a:schemeClr val="tx1">
-                  <a:lumMod val="75000"/>
-                  <a:lumOff val="25000"/>
-                </a:schemeClr>
-              </a:solidFill>
-            </a:endParaRPr>
           </a:p>
         </p:txBody>
       </p:sp>
@@ -4336,7 +4405,7 @@
 </p:sld>
 </file>
 
-<file path=ppt/slides/slide4.xml><?xml version="1.0" encoding="utf-8"?>
+<file path=ppt/slides/slide5.xml><?xml version="1.0" encoding="utf-8"?>
 <p:sld xmlns:a="http://schemas.openxmlformats.org/drawingml/2006/main" xmlns:r="http://schemas.openxmlformats.org/officeDocument/2006/relationships" xmlns:p="http://schemas.openxmlformats.org/presentationml/2006/main">
   <p:cSld>
     <p:spTree>
@@ -4513,14 +4582,6 @@
               </a:rPr>
               <a:t>Google Slides decks</a:t>
             </a:r>
-            <a:endParaRPr lang="en-US" sz="5400" dirty="0" smtClean="0">
-              <a:solidFill>
-                <a:schemeClr val="tx1">
-                  <a:lumMod val="75000"/>
-                  <a:lumOff val="25000"/>
-                </a:schemeClr>
-              </a:solidFill>
-            </a:endParaRPr>
           </a:p>
         </p:txBody>
       </p:sp>
@@ -4544,7 +4605,7 @@
 </p:sld>
 </file>
 
-<file path=ppt/slides/slide5.xml><?xml version="1.0" encoding="utf-8"?>
+<file path=ppt/slides/slide6.xml><?xml version="1.0" encoding="utf-8"?>
 <p:sld xmlns:a="http://schemas.openxmlformats.org/drawingml/2006/main" xmlns:r="http://schemas.openxmlformats.org/officeDocument/2006/relationships" xmlns:p="http://schemas.openxmlformats.org/presentationml/2006/main">
   <p:cSld>
     <p:bg>
@@ -5093,7 +5154,7 @@
 </p:sld>
 </file>
 
-<file path=ppt/slides/slide6.xml><?xml version="1.0" encoding="utf-8"?>
+<file path=ppt/slides/slide7.xml><?xml version="1.0" encoding="utf-8"?>
 <p:sld xmlns:a="http://schemas.openxmlformats.org/drawingml/2006/main" xmlns:r="http://schemas.openxmlformats.org/officeDocument/2006/relationships" xmlns:p="http://schemas.openxmlformats.org/presentationml/2006/main">
   <p:cSld>
     <p:spTree>

</xml_diff>

<commit_message>
app: Rename app to comply with Google policies
</commit_message>
<xml_diff>
--- a/dist-env/src/promo.pptx
+++ b/dist-env/src/promo.pptx
@@ -203,7 +203,7 @@
           <a:p>
             <a:fld id="{DA1CD8E3-66EA-4860-B6DD-845275B8FDA1}" type="datetimeFigureOut">
               <a:rPr lang="en-GB" smtClean="0"/>
-              <a:t>04/06/18</a:t>
+              <a:t>16/07/18</a:t>
             </a:fld>
             <a:endParaRPr lang="en-GB"/>
           </a:p>
@@ -1042,7 +1042,7 @@
           <a:p>
             <a:fld id="{2ACA34EB-1D88-4E75-BE2F-6D09A74D6EB9}" type="datetimeFigureOut">
               <a:rPr lang="en-GB" smtClean="0"/>
-              <a:t>04/06/18</a:t>
+              <a:t>16/07/18</a:t>
             </a:fld>
             <a:endParaRPr lang="en-GB"/>
           </a:p>
@@ -1212,7 +1212,7 @@
           <a:p>
             <a:fld id="{2ACA34EB-1D88-4E75-BE2F-6D09A74D6EB9}" type="datetimeFigureOut">
               <a:rPr lang="en-GB" smtClean="0"/>
-              <a:t>04/06/18</a:t>
+              <a:t>16/07/18</a:t>
             </a:fld>
             <a:endParaRPr lang="en-GB"/>
           </a:p>
@@ -1392,7 +1392,7 @@
           <a:p>
             <a:fld id="{2ACA34EB-1D88-4E75-BE2F-6D09A74D6EB9}" type="datetimeFigureOut">
               <a:rPr lang="en-GB" smtClean="0"/>
-              <a:t>04/06/18</a:t>
+              <a:t>16/07/18</a:t>
             </a:fld>
             <a:endParaRPr lang="en-GB"/>
           </a:p>
@@ -1562,7 +1562,7 @@
           <a:p>
             <a:fld id="{2ACA34EB-1D88-4E75-BE2F-6D09A74D6EB9}" type="datetimeFigureOut">
               <a:rPr lang="en-GB" smtClean="0"/>
-              <a:t>04/06/18</a:t>
+              <a:t>16/07/18</a:t>
             </a:fld>
             <a:endParaRPr lang="en-GB"/>
           </a:p>
@@ -1808,7 +1808,7 @@
           <a:p>
             <a:fld id="{2ACA34EB-1D88-4E75-BE2F-6D09A74D6EB9}" type="datetimeFigureOut">
               <a:rPr lang="en-GB" smtClean="0"/>
-              <a:t>04/06/18</a:t>
+              <a:t>16/07/18</a:t>
             </a:fld>
             <a:endParaRPr lang="en-GB"/>
           </a:p>
@@ -2040,7 +2040,7 @@
           <a:p>
             <a:fld id="{2ACA34EB-1D88-4E75-BE2F-6D09A74D6EB9}" type="datetimeFigureOut">
               <a:rPr lang="en-GB" smtClean="0"/>
-              <a:t>04/06/18</a:t>
+              <a:t>16/07/18</a:t>
             </a:fld>
             <a:endParaRPr lang="en-GB"/>
           </a:p>
@@ -2407,7 +2407,7 @@
           <a:p>
             <a:fld id="{2ACA34EB-1D88-4E75-BE2F-6D09A74D6EB9}" type="datetimeFigureOut">
               <a:rPr lang="en-GB" smtClean="0"/>
-              <a:t>04/06/18</a:t>
+              <a:t>16/07/18</a:t>
             </a:fld>
             <a:endParaRPr lang="en-GB"/>
           </a:p>
@@ -2525,7 +2525,7 @@
           <a:p>
             <a:fld id="{2ACA34EB-1D88-4E75-BE2F-6D09A74D6EB9}" type="datetimeFigureOut">
               <a:rPr lang="en-GB" smtClean="0"/>
-              <a:t>04/06/18</a:t>
+              <a:t>16/07/18</a:t>
             </a:fld>
             <a:endParaRPr lang="en-GB"/>
           </a:p>
@@ -2620,7 +2620,7 @@
           <a:p>
             <a:fld id="{2ACA34EB-1D88-4E75-BE2F-6D09A74D6EB9}" type="datetimeFigureOut">
               <a:rPr lang="en-GB" smtClean="0"/>
-              <a:t>04/06/18</a:t>
+              <a:t>16/07/18</a:t>
             </a:fld>
             <a:endParaRPr lang="en-GB"/>
           </a:p>
@@ -2897,7 +2897,7 @@
           <a:p>
             <a:fld id="{2ACA34EB-1D88-4E75-BE2F-6D09A74D6EB9}" type="datetimeFigureOut">
               <a:rPr lang="en-GB" smtClean="0"/>
-              <a:t>04/06/18</a:t>
+              <a:t>16/07/18</a:t>
             </a:fld>
             <a:endParaRPr lang="en-GB"/>
           </a:p>
@@ -3150,7 +3150,7 @@
           <a:p>
             <a:fld id="{2ACA34EB-1D88-4E75-BE2F-6D09A74D6EB9}" type="datetimeFigureOut">
               <a:rPr lang="en-GB" smtClean="0"/>
-              <a:t>04/06/18</a:t>
+              <a:t>16/07/18</a:t>
             </a:fld>
             <a:endParaRPr lang="en-GB"/>
           </a:p>
@@ -3368,7 +3368,7 @@
           <a:p>
             <a:fld id="{2ACA34EB-1D88-4E75-BE2F-6D09A74D6EB9}" type="datetimeFigureOut">
               <a:rPr lang="en-GB" smtClean="0"/>
-              <a:t>04/06/18</a:t>
+              <a:t>16/07/18</a:t>
             </a:fld>
             <a:endParaRPr lang="en-GB"/>
           </a:p>
@@ -3828,7 +3828,20 @@
             </a:pPr>
             <a:r>
               <a:rPr lang="en-US" dirty="0" smtClean="0"/>
-              <a:t>3 – marquee 1400x560</a:t>
+              <a:t>3 – marquee </a:t>
+            </a:r>
+            <a:r>
+              <a:rPr lang="en-US" dirty="0" smtClean="0"/>
+              <a:t>1400x560</a:t>
+            </a:r>
+          </a:p>
+          <a:p>
+            <a:pPr marL="0" indent="0">
+              <a:buNone/>
+            </a:pPr>
+            <a:r>
+              <a:rPr lang="en-US" dirty="0" smtClean="0"/>
+              <a:t>4 – stub for screenshot 1280x800</a:t>
             </a:r>
             <a:endParaRPr lang="en-US" dirty="0"/>
           </a:p>
@@ -3903,8 +3916,8 @@
         </p:nvSpPr>
         <p:spPr>
           <a:xfrm>
-            <a:off x="2500874" y="120186"/>
-            <a:ext cx="6340197" cy="2308324"/>
+            <a:off x="2500874" y="594013"/>
+            <a:ext cx="5878532" cy="1200329"/>
           </a:xfrm>
           <a:prstGeom prst="rect">
             <a:avLst/>
@@ -3925,19 +3938,7 @@
                 <a:latin typeface="Arial" panose="020B0604020202020204" pitchFamily="34" charset="0"/>
                 <a:cs typeface="Arial" panose="020B0604020202020204" pitchFamily="34" charset="0"/>
               </a:rPr>
-              <a:t>Merge</a:t>
-            </a:r>
-          </a:p>
-          <a:p>
-            <a:r>
-              <a:rPr lang="en-US" sz="7200" b="1" dirty="0" smtClean="0">
-                <a:solidFill>
-                  <a:srgbClr val="0070C0"/>
-                </a:solidFill>
-                <a:latin typeface="Arial" panose="020B0604020202020204" pitchFamily="34" charset="0"/>
-                <a:cs typeface="Arial" panose="020B0604020202020204" pitchFamily="34" charset="0"/>
-              </a:rPr>
-              <a:t>Google Slides</a:t>
+              <a:t>Merge Slides</a:t>
             </a:r>
             <a:endParaRPr lang="en-GB" sz="7200" b="1" dirty="0">
               <a:solidFill>
@@ -3993,7 +3994,18 @@
                   </a:schemeClr>
                 </a:solidFill>
               </a:rPr>
-              <a:t>Google Slides decks</a:t>
+              <a:t>Slides </a:t>
+            </a:r>
+            <a:r>
+              <a:rPr lang="en-US" sz="5400" dirty="0" smtClean="0">
+                <a:solidFill>
+                  <a:schemeClr val="tx1">
+                    <a:lumMod val="75000"/>
+                    <a:lumOff val="25000"/>
+                  </a:schemeClr>
+                </a:solidFill>
+              </a:rPr>
+              <a:t>decks</a:t>
             </a:r>
           </a:p>
         </p:txBody>
@@ -4127,60 +4139,6 @@
       </p:pic>
       <p:sp>
         <p:nvSpPr>
-          <p:cNvPr id="8" name="TextBox 7"/>
-          <p:cNvSpPr txBox="1"/>
-          <p:nvPr/>
-        </p:nvSpPr>
-        <p:spPr>
-          <a:xfrm>
-            <a:off x="2500874" y="120186"/>
-            <a:ext cx="6340197" cy="2308324"/>
-          </a:xfrm>
-          <a:prstGeom prst="rect">
-            <a:avLst/>
-          </a:prstGeom>
-          <a:noFill/>
-        </p:spPr>
-        <p:txBody>
-          <a:bodyPr wrap="none" rtlCol="0">
-            <a:spAutoFit/>
-          </a:bodyPr>
-          <a:lstStyle/>
-          <a:p>
-            <a:r>
-              <a:rPr lang="en-US" sz="7200" b="1" dirty="0" smtClean="0">
-                <a:solidFill>
-                  <a:srgbClr val="0070C0"/>
-                </a:solidFill>
-                <a:latin typeface="Arial" panose="020B0604020202020204" pitchFamily="34" charset="0"/>
-                <a:cs typeface="Arial" panose="020B0604020202020204" pitchFamily="34" charset="0"/>
-              </a:rPr>
-              <a:t>Merge</a:t>
-            </a:r>
-          </a:p>
-          <a:p>
-            <a:r>
-              <a:rPr lang="en-US" sz="7200" b="1" dirty="0" smtClean="0">
-                <a:solidFill>
-                  <a:srgbClr val="0070C0"/>
-                </a:solidFill>
-                <a:latin typeface="Arial" panose="020B0604020202020204" pitchFamily="34" charset="0"/>
-                <a:cs typeface="Arial" panose="020B0604020202020204" pitchFamily="34" charset="0"/>
-              </a:rPr>
-              <a:t>Google Slides</a:t>
-            </a:r>
-            <a:endParaRPr lang="en-GB" sz="7200" b="1" dirty="0">
-              <a:solidFill>
-                <a:srgbClr val="0070C0"/>
-              </a:solidFill>
-              <a:latin typeface="Arial" panose="020B0604020202020204" pitchFamily="34" charset="0"/>
-              <a:cs typeface="Arial" panose="020B0604020202020204" pitchFamily="34" charset="0"/>
-            </a:endParaRPr>
-          </a:p>
-        </p:txBody>
-      </p:sp>
-      <p:sp>
-        <p:nvSpPr>
           <p:cNvPr id="12" name="TextBox 11"/>
           <p:cNvSpPr txBox="1"/>
           <p:nvPr/>
@@ -4223,8 +4181,61 @@
                   </a:schemeClr>
                 </a:solidFill>
               </a:rPr>
-              <a:t>Google Slides decks</a:t>
-            </a:r>
+              <a:t>Slides </a:t>
+            </a:r>
+            <a:r>
+              <a:rPr lang="en-US" sz="5400" dirty="0" smtClean="0">
+                <a:solidFill>
+                  <a:schemeClr val="tx1">
+                    <a:lumMod val="75000"/>
+                    <a:lumOff val="25000"/>
+                  </a:schemeClr>
+                </a:solidFill>
+              </a:rPr>
+              <a:t>decks</a:t>
+            </a:r>
+          </a:p>
+        </p:txBody>
+      </p:sp>
+      <p:sp>
+        <p:nvSpPr>
+          <p:cNvPr id="6" name="TextBox 5"/>
+          <p:cNvSpPr txBox="1"/>
+          <p:nvPr/>
+        </p:nvSpPr>
+        <p:spPr>
+          <a:xfrm>
+            <a:off x="2500874" y="594013"/>
+            <a:ext cx="5878532" cy="1200329"/>
+          </a:xfrm>
+          <a:prstGeom prst="rect">
+            <a:avLst/>
+          </a:prstGeom>
+          <a:noFill/>
+        </p:spPr>
+        <p:txBody>
+          <a:bodyPr wrap="none" rtlCol="0">
+            <a:spAutoFit/>
+          </a:bodyPr>
+          <a:lstStyle/>
+          <a:p>
+            <a:r>
+              <a:rPr lang="en-US" sz="7200" b="1" dirty="0" smtClean="0">
+                <a:solidFill>
+                  <a:srgbClr val="0070C0"/>
+                </a:solidFill>
+                <a:latin typeface="Arial" panose="020B0604020202020204" pitchFamily="34" charset="0"/>
+                <a:cs typeface="Arial" panose="020B0604020202020204" pitchFamily="34" charset="0"/>
+              </a:rPr>
+              <a:t>Merge Slides</a:t>
+            </a:r>
+            <a:endParaRPr lang="en-GB" sz="7200" b="1" dirty="0">
+              <a:solidFill>
+                <a:srgbClr val="0070C0"/>
+              </a:solidFill>
+              <a:latin typeface="Arial" panose="020B0604020202020204" pitchFamily="34" charset="0"/>
+              <a:cs typeface="Arial" panose="020B0604020202020204" pitchFamily="34" charset="0"/>
+            </a:endParaRPr>
           </a:p>
         </p:txBody>
       </p:sp>
@@ -4297,60 +4308,6 @@
       </p:pic>
       <p:sp>
         <p:nvSpPr>
-          <p:cNvPr id="7" name="TextBox 6"/>
-          <p:cNvSpPr txBox="1"/>
-          <p:nvPr/>
-        </p:nvSpPr>
-        <p:spPr>
-          <a:xfrm>
-            <a:off x="2500874" y="120186"/>
-            <a:ext cx="6340197" cy="2308324"/>
-          </a:xfrm>
-          <a:prstGeom prst="rect">
-            <a:avLst/>
-          </a:prstGeom>
-          <a:noFill/>
-        </p:spPr>
-        <p:txBody>
-          <a:bodyPr wrap="none" rtlCol="0">
-            <a:spAutoFit/>
-          </a:bodyPr>
-          <a:lstStyle/>
-          <a:p>
-            <a:r>
-              <a:rPr lang="en-US" sz="7200" b="1" dirty="0" smtClean="0">
-                <a:solidFill>
-                  <a:srgbClr val="0070C0"/>
-                </a:solidFill>
-                <a:latin typeface="Arial" panose="020B0604020202020204" pitchFamily="34" charset="0"/>
-                <a:cs typeface="Arial" panose="020B0604020202020204" pitchFamily="34" charset="0"/>
-              </a:rPr>
-              <a:t>Merge</a:t>
-            </a:r>
-          </a:p>
-          <a:p>
-            <a:r>
-              <a:rPr lang="en-US" sz="7200" b="1" dirty="0" smtClean="0">
-                <a:solidFill>
-                  <a:srgbClr val="0070C0"/>
-                </a:solidFill>
-                <a:latin typeface="Arial" panose="020B0604020202020204" pitchFamily="34" charset="0"/>
-                <a:cs typeface="Arial" panose="020B0604020202020204" pitchFamily="34" charset="0"/>
-              </a:rPr>
-              <a:t>Google Slides</a:t>
-            </a:r>
-            <a:endParaRPr lang="en-GB" sz="7200" b="1" dirty="0">
-              <a:solidFill>
-                <a:srgbClr val="0070C0"/>
-              </a:solidFill>
-              <a:latin typeface="Arial" panose="020B0604020202020204" pitchFamily="34" charset="0"/>
-              <a:cs typeface="Arial" panose="020B0604020202020204" pitchFamily="34" charset="0"/>
-            </a:endParaRPr>
-          </a:p>
-        </p:txBody>
-      </p:sp>
-      <p:sp>
-        <p:nvSpPr>
           <p:cNvPr id="8" name="TextBox 7"/>
           <p:cNvSpPr txBox="1"/>
           <p:nvPr/>
@@ -4380,11 +4337,105 @@
                   </a:schemeClr>
                 </a:solidFill>
               </a:rPr>
-              <a:t>Breeze through merging Google Slides decks</a:t>
-            </a:r>
-          </a:p>
-        </p:txBody>
-      </p:sp>
+              <a:t>Breeze through merging </a:t>
+            </a:r>
+            <a:r>
+              <a:rPr lang="en-US" sz="3200" dirty="0" smtClean="0">
+                <a:solidFill>
+                  <a:schemeClr val="tx1">
+                    <a:lumMod val="75000"/>
+                    <a:lumOff val="25000"/>
+                  </a:schemeClr>
+                </a:solidFill>
+              </a:rPr>
+              <a:t>Slides </a:t>
+            </a:r>
+            <a:r>
+              <a:rPr lang="en-US" sz="3200" dirty="0" smtClean="0">
+                <a:solidFill>
+                  <a:schemeClr val="tx1">
+                    <a:lumMod val="75000"/>
+                    <a:lumOff val="25000"/>
+                  </a:schemeClr>
+                </a:solidFill>
+              </a:rPr>
+              <a:t>decks</a:t>
+            </a:r>
+          </a:p>
+        </p:txBody>
+      </p:sp>
+      <p:sp>
+        <p:nvSpPr>
+          <p:cNvPr id="5" name="TextBox 4"/>
+          <p:cNvSpPr txBox="1"/>
+          <p:nvPr/>
+        </p:nvSpPr>
+        <p:spPr>
+          <a:xfrm>
+            <a:off x="2500874" y="219939"/>
+            <a:ext cx="6514925" cy="1323439"/>
+          </a:xfrm>
+          <a:prstGeom prst="rect">
+            <a:avLst/>
+          </a:prstGeom>
+          <a:noFill/>
+        </p:spPr>
+        <p:txBody>
+          <a:bodyPr wrap="none" rtlCol="0">
+            <a:spAutoFit/>
+          </a:bodyPr>
+          <a:lstStyle/>
+          <a:p>
+            <a:r>
+              <a:rPr lang="en-US" sz="7800" b="1" dirty="0" smtClean="0">
+                <a:solidFill>
+                  <a:srgbClr val="0070C0"/>
+                </a:solidFill>
+                <a:latin typeface="Arial" panose="020B0604020202020204" pitchFamily="34" charset="0"/>
+                <a:cs typeface="Arial" panose="020B0604020202020204" pitchFamily="34" charset="0"/>
+              </a:rPr>
+              <a:t>Merge Slides</a:t>
+            </a:r>
+            <a:endParaRPr lang="en-GB" sz="7800" b="1" dirty="0">
+              <a:solidFill>
+                <a:srgbClr val="0070C0"/>
+              </a:solidFill>
+              <a:latin typeface="Arial" panose="020B0604020202020204" pitchFamily="34" charset="0"/>
+              <a:cs typeface="Arial" panose="020B0604020202020204" pitchFamily="34" charset="0"/>
+            </a:endParaRPr>
+          </a:p>
+        </p:txBody>
+      </p:sp>
+      <p:pic>
+        <p:nvPicPr>
+          <p:cNvPr id="6" name="Picture 5"/>
+          <p:cNvPicPr>
+            <a:picLocks noChangeAspect="1"/>
+          </p:cNvPicPr>
+          <p:nvPr/>
+        </p:nvPicPr>
+        <p:blipFill>
+          <a:blip r:embed="rId4">
+            <a:extLst>
+              <a:ext uri="{28A0092B-C50C-407E-A947-70E740481C1C}">
+                <a14:useLocalDpi xmlns:a14="http://schemas.microsoft.com/office/drawing/2010/main" val="0"/>
+              </a:ext>
+            </a:extLst>
+          </a:blip>
+          <a:stretch>
+            <a:fillRect/>
+          </a:stretch>
+        </p:blipFill>
+        <p:spPr>
+          <a:xfrm>
+            <a:off x="2500874" y="1505581"/>
+            <a:ext cx="2058065" cy="686022"/>
+          </a:xfrm>
+          <a:prstGeom prst="rect">
+            <a:avLst/>
+          </a:prstGeom>
+        </p:spPr>
+      </p:pic>
     </p:spTree>
     <p:extLst>
       <p:ext uri="{BB962C8B-B14F-4D97-AF65-F5344CB8AC3E}">
@@ -4484,60 +4535,6 @@
       </p:pic>
       <p:sp>
         <p:nvSpPr>
-          <p:cNvPr id="7" name="TextBox 6"/>
-          <p:cNvSpPr txBox="1"/>
-          <p:nvPr/>
-        </p:nvSpPr>
-        <p:spPr>
-          <a:xfrm>
-            <a:off x="2500874" y="120186"/>
-            <a:ext cx="6340197" cy="2308324"/>
-          </a:xfrm>
-          <a:prstGeom prst="rect">
-            <a:avLst/>
-          </a:prstGeom>
-          <a:noFill/>
-        </p:spPr>
-        <p:txBody>
-          <a:bodyPr wrap="none" rtlCol="0">
-            <a:spAutoFit/>
-          </a:bodyPr>
-          <a:lstStyle/>
-          <a:p>
-            <a:r>
-              <a:rPr lang="en-US" sz="7200" b="1" dirty="0" smtClean="0">
-                <a:solidFill>
-                  <a:srgbClr val="0070C0"/>
-                </a:solidFill>
-                <a:latin typeface="Arial" panose="020B0604020202020204" pitchFamily="34" charset="0"/>
-                <a:cs typeface="Arial" panose="020B0604020202020204" pitchFamily="34" charset="0"/>
-              </a:rPr>
-              <a:t>Merge</a:t>
-            </a:r>
-          </a:p>
-          <a:p>
-            <a:r>
-              <a:rPr lang="en-US" sz="7200" b="1" dirty="0" smtClean="0">
-                <a:solidFill>
-                  <a:srgbClr val="0070C0"/>
-                </a:solidFill>
-                <a:latin typeface="Arial" panose="020B0604020202020204" pitchFamily="34" charset="0"/>
-                <a:cs typeface="Arial" panose="020B0604020202020204" pitchFamily="34" charset="0"/>
-              </a:rPr>
-              <a:t>Google Slides</a:t>
-            </a:r>
-            <a:endParaRPr lang="en-GB" sz="7200" b="1" dirty="0">
-              <a:solidFill>
-                <a:srgbClr val="0070C0"/>
-              </a:solidFill>
-              <a:latin typeface="Arial" panose="020B0604020202020204" pitchFamily="34" charset="0"/>
-              <a:cs typeface="Arial" panose="020B0604020202020204" pitchFamily="34" charset="0"/>
-            </a:endParaRPr>
-          </a:p>
-        </p:txBody>
-      </p:sp>
-      <p:sp>
-        <p:nvSpPr>
           <p:cNvPr id="8" name="TextBox 7"/>
           <p:cNvSpPr txBox="1"/>
           <p:nvPr/>
@@ -4580,8 +4577,61 @@
                   </a:schemeClr>
                 </a:solidFill>
               </a:rPr>
-              <a:t>Google Slides decks</a:t>
-            </a:r>
+              <a:t>Slides </a:t>
+            </a:r>
+            <a:r>
+              <a:rPr lang="en-US" sz="5400" dirty="0" smtClean="0">
+                <a:solidFill>
+                  <a:schemeClr val="tx1">
+                    <a:lumMod val="75000"/>
+                    <a:lumOff val="25000"/>
+                  </a:schemeClr>
+                </a:solidFill>
+              </a:rPr>
+              <a:t>decks</a:t>
+            </a:r>
+          </a:p>
+        </p:txBody>
+      </p:sp>
+      <p:sp>
+        <p:nvSpPr>
+          <p:cNvPr id="6" name="TextBox 5"/>
+          <p:cNvSpPr txBox="1"/>
+          <p:nvPr/>
+        </p:nvSpPr>
+        <p:spPr>
+          <a:xfrm>
+            <a:off x="2500874" y="594013"/>
+            <a:ext cx="6514925" cy="1323439"/>
+          </a:xfrm>
+          <a:prstGeom prst="rect">
+            <a:avLst/>
+          </a:prstGeom>
+          <a:noFill/>
+        </p:spPr>
+        <p:txBody>
+          <a:bodyPr wrap="none" rtlCol="0">
+            <a:spAutoFit/>
+          </a:bodyPr>
+          <a:lstStyle/>
+          <a:p>
+            <a:r>
+              <a:rPr lang="en-US" sz="7800" b="1" dirty="0" smtClean="0">
+                <a:solidFill>
+                  <a:srgbClr val="0070C0"/>
+                </a:solidFill>
+                <a:latin typeface="Arial" panose="020B0604020202020204" pitchFamily="34" charset="0"/>
+                <a:cs typeface="Arial" panose="020B0604020202020204" pitchFamily="34" charset="0"/>
+              </a:rPr>
+              <a:t>Merge Slides</a:t>
+            </a:r>
+            <a:endParaRPr lang="en-GB" sz="7800" b="1" dirty="0">
+              <a:solidFill>
+                <a:srgbClr val="0070C0"/>
+              </a:solidFill>
+              <a:latin typeface="Arial" panose="020B0604020202020204" pitchFamily="34" charset="0"/>
+              <a:cs typeface="Arial" panose="020B0604020202020204" pitchFamily="34" charset="0"/>
+            </a:endParaRPr>
           </a:p>
         </p:txBody>
       </p:sp>

</xml_diff>